<commit_message>
Added module 12 added equipment aging to months and sales by quarter
</commit_message>
<xml_diff>
--- a/module-12/DeltaTeam-Module12-Final.pptx
+++ b/module-12/DeltaTeam-Module12-Final.pptx
@@ -11020,55 +11020,14 @@
           <a:p>
             <a:pPr marL="0"/>
             <a:r>
-              <a:rPr lang="en-US" sz="1200" b="0" i="0" dirty="0">
+              <a:rPr lang="en-US" b="0" i="0" dirty="0">
+                <a:solidFill>
+                  <a:srgbClr val="CCCCCC"/>
+                </a:solidFill>
                 <a:effectLst/>
+                <a:latin typeface="Menlo" panose="020B0609030804020204" pitchFamily="49" charset="0"/>
               </a:rPr>
-              <a:t>Equipment Type: Tent, Total Sold: 3 </a:t>
-            </a:r>
-          </a:p>
-          <a:p>
-            <a:pPr marL="0"/>
-            <a:r>
-              <a:rPr lang="en-US" sz="1200" b="0" i="0" dirty="0">
-                <a:effectLst/>
-              </a:rPr>
-              <a:t>Equipment Type: Backpack, Total Sold: 3 </a:t>
-            </a:r>
-          </a:p>
-          <a:p>
-            <a:pPr marL="0"/>
-            <a:r>
-              <a:rPr lang="en-US" sz="1200" b="0" i="0" dirty="0">
-                <a:effectLst/>
-              </a:rPr>
-              <a:t>Equipment Type: Sleeping Bag, Total Sold: 1 </a:t>
-            </a:r>
-          </a:p>
-          <a:p>
-            <a:pPr marL="0"/>
-            <a:r>
-              <a:rPr lang="en-US" sz="1200" b="0" i="0" dirty="0">
-                <a:effectLst/>
-              </a:rPr>
-              <a:t>Equipment Type: Hiking Boots, Total Sold: 1 </a:t>
-            </a:r>
-          </a:p>
-          <a:p>
-            <a:pPr marL="0"/>
-            <a:r>
-              <a:rPr lang="en-US" sz="1200" b="0" i="0" dirty="0">
-                <a:effectLst/>
-              </a:rPr>
-              <a:t>Equipment Type: Climbing Gear, Total Sold: 1 </a:t>
-            </a:r>
-          </a:p>
-          <a:p>
-            <a:pPr marL="0"/>
-            <a:r>
-              <a:rPr lang="en-US" sz="1200" b="0" i="0" dirty="0">
-                <a:effectLst/>
-              </a:rPr>
-              <a:t>Equipment Type: Water Filter, Total Sold: 1</a:t>
+              <a:t>Displaying Equipment Sales Report by Quarter - Mar-09-2024 06:43 PM: Equipment Type: Tent, Year: 2023, Quarter: 4, Total Sold: 1 Equipment Type: Water Filter, Year: 2023, Quarter: 4, Total Sold: 1 Equipment Type: Tent, Year: 2023, Quarter: 2, Total Sold: 3 Equipment Type: Backpack, Year: 2023, Quarter: 2, Total Sold: 3 Equipment Type: Sleeping Bag, Year: 2023, Quarter: 2, Total Sold: 1 Equipment Type: Hiking Boots, Year: 2023, Quarter: 2, Total Sold: 1 Equipment Type: Climbing Gear, Year: 2023, Quarter: 2, Total Sold: 1 Equipment Type: Water Filter, Year: 2023, Quarter: 2, Total Sold: 1 Equipment Type: Sleeping Bag, Year: 2023, Quarter: 1, Total Sold: 1 Equipment Type: Climbing Gear, Year: 2023, Quarter: 1, Total Sold: 1 Equipment Type: Backpack, Year: 2022, Quarter: 3, Total Sold: 3 Equipment Type: Hiking Boots, Year: 2022, Quarter: 2, Total Sold: 6 Equipment Type: Backpack, Year: 2022, Quarter: 2, Total Sold: 3 Equipment Type: Sleeping Bag, Year: 2022, Quarter: 2, Total Sold: 3</a:t>
             </a:r>
             <a:endParaRPr lang="en-US" sz="1200" dirty="0"/>
           </a:p>
@@ -15380,7 +15339,7 @@
           <a:lstStyle/>
           <a:p>
             <a:r>
-              <a:rPr lang="en-US" sz="2000">
+              <a:rPr lang="en-US" sz="2000" dirty="0">
                 <a:solidFill>
                   <a:schemeClr val="bg1"/>
                 </a:solidFill>
@@ -15388,7 +15347,7 @@
               <a:t>Delta Team - March 8</a:t>
             </a:r>
             <a:r>
-              <a:rPr lang="en-US" sz="2000" baseline="30000">
+              <a:rPr lang="en-US" sz="2000" baseline="30000" dirty="0">
                 <a:solidFill>
                   <a:schemeClr val="bg1"/>
                 </a:solidFill>
@@ -15396,20 +15355,12 @@
               <a:t>th</a:t>
             </a:r>
             <a:r>
-              <a:rPr lang="en-US" sz="2000">
-                <a:solidFill>
-                  <a:schemeClr val="bg1"/>
-                </a:solidFill>
-              </a:rPr>
-              <a:t>, </a:t>
-            </a:r>
-            <a:r>
               <a:rPr lang="en-US" sz="2000" dirty="0">
                 <a:solidFill>
                   <a:schemeClr val="bg1"/>
                 </a:solidFill>
               </a:rPr>
-              <a:t>2024</a:t>
+              <a:t>, 2024</a:t>
             </a:r>
             <a:endParaRPr lang="en-US" sz="2000" baseline="30000" dirty="0">
               <a:solidFill>
@@ -20343,15 +20294,15 @@
           </p:cNvPicPr>
           <p:nvPr/>
         </p:nvPicPr>
-        <p:blipFill rotWithShape="1">
+        <p:blipFill>
           <a:blip r:embed="rId3"/>
-          <a:srcRect l="1897" r="1094"/>
+          <a:srcRect l="1940" r="1940"/>
           <a:stretch/>
         </p:blipFill>
         <p:spPr>
           <a:xfrm>
-            <a:off x="209327" y="1905830"/>
-            <a:ext cx="5361255" cy="2766531"/>
+            <a:off x="279142" y="1797814"/>
+            <a:ext cx="5221625" cy="2982564"/>
           </a:xfrm>
           <a:prstGeom prst="rect">
             <a:avLst/>
@@ -20396,7 +20347,7 @@
                 </a:solidFill>
                 <a:effectLst/>
               </a:rPr>
-              <a:t>This report lists each piece of equipment, its type, and the number of months since purchase, helping identify items that may need replacement or maintenance.</a:t>
+              <a:t>This report lists each piece of equipment, its type, and the years since purchase, helping identify items needing replacement or maintenance.</a:t>
             </a:r>
           </a:p>
           <a:p>
@@ -20436,7 +20387,7 @@
                 </a:solidFill>
                 <a:effectLst/>
               </a:rPr>
-              <a:t> Equipment ID: 1 (Tent) shows 776 days since purchase, indicating it may soon need evaluation for usability</a:t>
+              <a:t> Equipment ID: 1 (Tent) shows 2 years since purchase, indicating it may soon need evaluation for usability</a:t>
             </a:r>
             <a:r>
               <a:rPr lang="en-US" sz="2000" b="0" i="0" u="none" strike="noStrike" dirty="0">
@@ -20808,14 +20759,13 @@
         </p:nvPicPr>
         <p:blipFill>
           <a:blip r:embed="rId3"/>
-          <a:stretch>
-            <a:fillRect/>
-          </a:stretch>
+          <a:srcRect/>
+          <a:stretch/>
         </p:blipFill>
         <p:spPr>
           <a:xfrm>
-            <a:off x="279143" y="863877"/>
-            <a:ext cx="5221625" cy="5130246"/>
+            <a:off x="95964" y="1660886"/>
+            <a:ext cx="5587981" cy="3327674"/>
           </a:xfrm>
           <a:prstGeom prst="rect">
             <a:avLst/>

</xml_diff>